<commit_message>
Everything but the executive summary and conclusion
</commit_message>
<xml_diff>
--- a/Practicum 1 presentation.pptx
+++ b/Practicum 1 presentation.pptx
@@ -14,11 +14,16 @@
     <p:sldId id="258" r:id="rId8"/>
     <p:sldId id="259" r:id="rId9"/>
     <p:sldId id="268" r:id="rId10"/>
-    <p:sldId id="260" r:id="rId11"/>
-    <p:sldId id="265" r:id="rId12"/>
-    <p:sldId id="261" r:id="rId13"/>
-    <p:sldId id="266" r:id="rId14"/>
-    <p:sldId id="269" r:id="rId15"/>
+    <p:sldId id="270" r:id="rId11"/>
+    <p:sldId id="272" r:id="rId12"/>
+    <p:sldId id="275" r:id="rId13"/>
+    <p:sldId id="273" r:id="rId14"/>
+    <p:sldId id="274" r:id="rId15"/>
+    <p:sldId id="260" r:id="rId16"/>
+    <p:sldId id="265" r:id="rId17"/>
+    <p:sldId id="261" r:id="rId18"/>
+    <p:sldId id="266" r:id="rId19"/>
+    <p:sldId id="269" r:id="rId20"/>
   </p:sldIdLst>
   <p:sldSz cx="12192000" cy="6858000"/>
   <p:notesSz cx="6858000" cy="9144000"/>
@@ -7788,67 +7793,106 @@
           <a:p>
             <a:r>
               <a:rPr lang="en-US" dirty="0"/>
-              <a:t>Importance of Work</a:t>
-            </a:r>
-          </a:p>
-        </p:txBody>
-      </p:sp>
-      <p:sp>
-        <p:nvSpPr>
-          <p:cNvPr id="3" name="Content Placeholder 2"/>
-          <p:cNvSpPr>
-            <a:spLocks noGrp="1"/>
-          </p:cNvSpPr>
+              <a:t>Preliminary results</a:t>
+            </a:r>
+          </a:p>
+        </p:txBody>
+      </p:sp>
+      <p:pic>
+        <p:nvPicPr>
+          <p:cNvPr id="6" name="Content Placeholder 5"/>
+          <p:cNvPicPr>
+            <a:picLocks noGrp="1" noChangeAspect="1"/>
+          </p:cNvPicPr>
           <p:nvPr>
             <p:ph sz="half" idx="1"/>
           </p:nvPr>
-        </p:nvSpPr>
-        <p:spPr/>
-        <p:txBody>
-          <a:bodyPr>
-            <a:normAutofit/>
+        </p:nvPicPr>
+        <p:blipFill>
+          <a:blip r:embed="rId2"/>
+          <a:stretch>
+            <a:fillRect/>
+          </a:stretch>
+        </p:blipFill>
+        <p:spPr>
+          <a:xfrm>
+            <a:off x="417309" y="2887694"/>
+            <a:ext cx="3564756" cy="3327106"/>
+          </a:xfrm>
+        </p:spPr>
+      </p:pic>
+      <p:pic>
+        <p:nvPicPr>
+          <p:cNvPr id="8" name="Content Placeholder 7"/>
+          <p:cNvPicPr>
+            <a:picLocks noGrp="1" noChangeAspect="1"/>
+          </p:cNvPicPr>
+          <p:nvPr>
+            <p:ph sz="half" idx="2"/>
+          </p:nvPr>
+        </p:nvPicPr>
+        <p:blipFill>
+          <a:blip r:embed="rId3"/>
+          <a:stretch>
+            <a:fillRect/>
+          </a:stretch>
+        </p:blipFill>
+        <p:spPr>
+          <a:xfrm>
+            <a:off x="8107740" y="2877616"/>
+            <a:ext cx="3640564" cy="3337184"/>
+          </a:xfrm>
+        </p:spPr>
+      </p:pic>
+      <p:pic>
+        <p:nvPicPr>
+          <p:cNvPr id="10" name="Picture 9"/>
+          <p:cNvPicPr>
+            <a:picLocks noChangeAspect="1"/>
+          </p:cNvPicPr>
+          <p:nvPr/>
+        </p:nvPicPr>
+        <p:blipFill>
+          <a:blip r:embed="rId4"/>
+          <a:stretch>
+            <a:fillRect/>
+          </a:stretch>
+        </p:blipFill>
+        <p:spPr>
+          <a:xfrm>
+            <a:off x="4323260" y="2887694"/>
+            <a:ext cx="3496760" cy="3327106"/>
+          </a:xfrm>
+          <a:prstGeom prst="rect">
+            <a:avLst/>
+          </a:prstGeom>
+        </p:spPr>
+      </p:pic>
+      <p:sp>
+        <p:nvSpPr>
+          <p:cNvPr id="11" name="TextBox 10"/>
+          <p:cNvSpPr txBox="1"/>
+          <p:nvPr/>
+        </p:nvSpPr>
+        <p:spPr>
+          <a:xfrm>
+            <a:off x="798653" y="2176041"/>
+            <a:ext cx="8518967" cy="369332"/>
+          </a:xfrm>
+          <a:prstGeom prst="rect">
+            <a:avLst/>
+          </a:prstGeom>
+          <a:noFill/>
+        </p:spPr>
+        <p:txBody>
+          <a:bodyPr wrap="square" rtlCol="0">
+            <a:spAutoFit/>
           </a:bodyPr>
           <a:lstStyle/>
           <a:p>
             <a:r>
               <a:rPr lang="en-US" dirty="0"/>
-              <a:t>0.2% of the population is estimated to be affected by this condition – about 500,000 people in the US alone</a:t>
-            </a:r>
-          </a:p>
-          <a:p>
-            <a:r>
-              <a:rPr lang="en-US" dirty="0"/>
-              <a:t>25% of patients are disabled to the point of being unable to work</a:t>
-            </a:r>
-          </a:p>
-        </p:txBody>
-      </p:sp>
-      <p:sp>
-        <p:nvSpPr>
-          <p:cNvPr id="4" name="Content Placeholder 3"/>
-          <p:cNvSpPr>
-            <a:spLocks noGrp="1"/>
-          </p:cNvSpPr>
-          <p:nvPr>
-            <p:ph sz="half" idx="2"/>
-          </p:nvPr>
-        </p:nvSpPr>
-        <p:spPr/>
-        <p:txBody>
-          <a:bodyPr>
-            <a:normAutofit/>
-          </a:bodyPr>
-          <a:lstStyle/>
-          <a:p>
-            <a:r>
-              <a:rPr lang="en-US" dirty="0"/>
-              <a:t>Current treatment is limited to trial and error, and is poorly quantified – feeling better or worse without hard measurements</a:t>
-            </a:r>
-          </a:p>
-          <a:p>
-            <a:r>
-              <a:rPr lang="en-US" dirty="0"/>
-              <a:t>Current treatment has no long term studies on viability or effects – no FDA approved medication for this syndrome</a:t>
+              <a:t>Averages by day of week for heart rate in bpm, steps, and sleep in minutes</a:t>
             </a:r>
           </a:p>
         </p:txBody>
@@ -7856,7 +7900,7 @@
     </p:spTree>
     <p:extLst>
       <p:ext uri="{BB962C8B-B14F-4D97-AF65-F5344CB8AC3E}">
-        <p14:creationId xmlns:p14="http://schemas.microsoft.com/office/powerpoint/2010/main" val="3013585068"/>
+        <p14:creationId xmlns:p14="http://schemas.microsoft.com/office/powerpoint/2010/main" val="4000424421"/>
       </p:ext>
     </p:extLst>
   </p:cSld>
@@ -7883,84 +7927,103 @@
           <a:chExt cx="0" cy="0"/>
         </a:xfrm>
       </p:grpSpPr>
-      <p:sp>
-        <p:nvSpPr>
-          <p:cNvPr id="2" name="Title 1"/>
-          <p:cNvSpPr>
-            <a:spLocks noGrp="1"/>
-          </p:cNvSpPr>
-          <p:nvPr>
-            <p:ph type="title"/>
-          </p:nvPr>
-        </p:nvSpPr>
-        <p:spPr/>
-        <p:txBody>
-          <a:bodyPr/>
-          <a:lstStyle/>
-          <a:p>
-            <a:r>
-              <a:rPr lang="en-US" dirty="0"/>
-              <a:t>Importance of Work cont.</a:t>
-            </a:r>
-          </a:p>
-        </p:txBody>
-      </p:sp>
-      <p:sp>
-        <p:nvSpPr>
-          <p:cNvPr id="3" name="Content Placeholder 2"/>
-          <p:cNvSpPr>
-            <a:spLocks noGrp="1"/>
-          </p:cNvSpPr>
-          <p:nvPr>
-            <p:ph sz="half" idx="1"/>
-          </p:nvPr>
-        </p:nvSpPr>
-        <p:spPr/>
-        <p:txBody>
-          <a:bodyPr>
-            <a:normAutofit lnSpcReduction="10000"/>
+      <p:pic>
+        <p:nvPicPr>
+          <p:cNvPr id="2" name="Content Placeholder 5"/>
+          <p:cNvPicPr>
+            <a:picLocks noChangeAspect="1"/>
+          </p:cNvPicPr>
+          <p:nvPr/>
+        </p:nvPicPr>
+        <p:blipFill>
+          <a:blip r:embed="rId2"/>
+          <a:stretch>
+            <a:fillRect/>
+          </a:stretch>
+        </p:blipFill>
+        <p:spPr>
+          <a:xfrm>
+            <a:off x="630254" y="507713"/>
+            <a:ext cx="4489608" cy="2840171"/>
+          </a:xfrm>
+          <a:prstGeom prst="rect">
+            <a:avLst/>
+          </a:prstGeom>
+        </p:spPr>
+      </p:pic>
+      <p:pic>
+        <p:nvPicPr>
+          <p:cNvPr id="3" name="Content Placeholder 7"/>
+          <p:cNvPicPr>
+            <a:picLocks noChangeAspect="1"/>
+          </p:cNvPicPr>
+          <p:nvPr/>
+        </p:nvPicPr>
+        <p:blipFill>
+          <a:blip r:embed="rId3"/>
+          <a:stretch>
+            <a:fillRect/>
+          </a:stretch>
+        </p:blipFill>
+        <p:spPr>
+          <a:xfrm>
+            <a:off x="5680883" y="3495368"/>
+            <a:ext cx="4448441" cy="2775286"/>
+          </a:xfrm>
+          <a:prstGeom prst="rect">
+            <a:avLst/>
+          </a:prstGeom>
+        </p:spPr>
+      </p:pic>
+      <p:pic>
+        <p:nvPicPr>
+          <p:cNvPr id="4" name="Picture 3"/>
+          <p:cNvPicPr>
+            <a:picLocks noChangeAspect="1"/>
+          </p:cNvPicPr>
+          <p:nvPr/>
+        </p:nvPicPr>
+        <p:blipFill>
+          <a:blip r:embed="rId4"/>
+          <a:stretch>
+            <a:fillRect/>
+          </a:stretch>
+        </p:blipFill>
+        <p:spPr>
+          <a:xfrm>
+            <a:off x="659938" y="3486784"/>
+            <a:ext cx="4459924" cy="2763549"/>
+          </a:xfrm>
+          <a:prstGeom prst="rect">
+            <a:avLst/>
+          </a:prstGeom>
+        </p:spPr>
+      </p:pic>
+      <p:sp>
+        <p:nvSpPr>
+          <p:cNvPr id="5" name="TextBox 4"/>
+          <p:cNvSpPr txBox="1"/>
+          <p:nvPr/>
+        </p:nvSpPr>
+        <p:spPr>
+          <a:xfrm>
+            <a:off x="5545394" y="663677"/>
+            <a:ext cx="4527754" cy="923330"/>
+          </a:xfrm>
+          <a:prstGeom prst="rect">
+            <a:avLst/>
+          </a:prstGeom>
+          <a:noFill/>
+        </p:spPr>
+        <p:txBody>
+          <a:bodyPr wrap="square" rtlCol="0">
+            <a:spAutoFit/>
           </a:bodyPr>
           <a:lstStyle/>
           <a:p>
             <a:r>
               <a:rPr lang="en-US" dirty="0"/>
-              <a:t>Potential proof of concept</a:t>
-            </a:r>
-          </a:p>
-          <a:p>
-            <a:r>
-              <a:rPr lang="en-US" dirty="0"/>
-              <a:t>If observational and quantitative methods are proven viable using commercial wearable technology this technique could be expanded to medical experiments into medication</a:t>
-            </a:r>
-          </a:p>
-        </p:txBody>
-      </p:sp>
-      <p:sp>
-        <p:nvSpPr>
-          <p:cNvPr id="4" name="Content Placeholder 3"/>
-          <p:cNvSpPr>
-            <a:spLocks noGrp="1"/>
-          </p:cNvSpPr>
-          <p:nvPr>
-            <p:ph sz="half" idx="2"/>
-          </p:nvPr>
-        </p:nvSpPr>
-        <p:spPr/>
-        <p:txBody>
-          <a:bodyPr>
-            <a:normAutofit lnSpcReduction="10000"/>
-          </a:bodyPr>
-          <a:lstStyle/>
-          <a:p>
-            <a:r>
-              <a:rPr lang="en-US" dirty="0"/>
-              <a:t>If associations and patterns are identified and a model can be built to predict symptoms, these identified factors can be used to guide additional research into the underlying mechanisms</a:t>
-            </a:r>
-          </a:p>
-          <a:p>
-            <a:r>
-              <a:rPr lang="en-US" dirty="0"/>
-              <a:t>Potential cost saving method in conduction observational studies and research experiments</a:t>
+              <a:t>Box plots showing the averages per day of the week for heart rate by bpm, steps, and sleep by minute</a:t>
             </a:r>
           </a:p>
         </p:txBody>
@@ -7968,7 +8031,7 @@
     </p:spTree>
     <p:extLst>
       <p:ext uri="{BB962C8B-B14F-4D97-AF65-F5344CB8AC3E}">
-        <p14:creationId xmlns:p14="http://schemas.microsoft.com/office/powerpoint/2010/main" val="3325926129"/>
+        <p14:creationId xmlns:p14="http://schemas.microsoft.com/office/powerpoint/2010/main" val="3603667890"/>
       </p:ext>
     </p:extLst>
   </p:cSld>
@@ -7995,97 +8058,58 @@
           <a:chExt cx="0" cy="0"/>
         </a:xfrm>
       </p:grpSpPr>
-      <p:sp>
-        <p:nvSpPr>
-          <p:cNvPr id="2" name="Title 1"/>
-          <p:cNvSpPr>
-            <a:spLocks noGrp="1"/>
-          </p:cNvSpPr>
-          <p:nvPr>
-            <p:ph type="title"/>
-          </p:nvPr>
-        </p:nvSpPr>
-        <p:spPr/>
-        <p:txBody>
-          <a:bodyPr/>
-          <a:lstStyle/>
-          <a:p>
-            <a:r>
-              <a:rPr lang="en-US" dirty="0"/>
-              <a:t>Potential Challenges</a:t>
-            </a:r>
-          </a:p>
-        </p:txBody>
-      </p:sp>
-      <p:sp>
-        <p:nvSpPr>
-          <p:cNvPr id="3" name="Content Placeholder 2"/>
-          <p:cNvSpPr>
-            <a:spLocks noGrp="1"/>
-          </p:cNvSpPr>
-          <p:nvPr>
-            <p:ph sz="half" idx="1"/>
-          </p:nvPr>
-        </p:nvSpPr>
-        <p:spPr/>
-        <p:txBody>
-          <a:bodyPr/>
-          <a:lstStyle/>
-          <a:p>
-            <a:r>
-              <a:rPr lang="en-US" dirty="0"/>
-              <a:t>Accuracy</a:t>
-            </a:r>
-          </a:p>
-          <a:p>
-            <a:r>
-              <a:rPr lang="en-US" dirty="0"/>
-              <a:t>Missing data</a:t>
-            </a:r>
-          </a:p>
-          <a:p>
-            <a:r>
-              <a:rPr lang="en-US" dirty="0"/>
-              <a:t>Acceptance of the medical community</a:t>
-            </a:r>
-          </a:p>
-          <a:p>
-            <a:r>
-              <a:rPr lang="en-US" dirty="0"/>
-              <a:t>Limited scope – single patient study</a:t>
-            </a:r>
-          </a:p>
-          <a:p>
-            <a:r>
-              <a:rPr lang="en-US" dirty="0"/>
-              <a:t>Limited medical knowledge of the involved researchers</a:t>
-            </a:r>
-          </a:p>
-        </p:txBody>
-      </p:sp>
-      <p:sp>
-        <p:nvSpPr>
-          <p:cNvPr id="4" name="Content Placeholder 3"/>
-          <p:cNvSpPr>
-            <a:spLocks noGrp="1"/>
-          </p:cNvSpPr>
-          <p:nvPr>
-            <p:ph sz="half" idx="2"/>
-          </p:nvPr>
-        </p:nvSpPr>
-        <p:spPr/>
-        <p:txBody>
-          <a:bodyPr/>
-          <a:lstStyle/>
-          <a:p>
-            <a:endParaRPr lang="en-US" dirty="0"/>
-          </a:p>
-        </p:txBody>
-      </p:sp>
+      <p:pic>
+        <p:nvPicPr>
+          <p:cNvPr id="2" name="Content Placeholder 13"/>
+          <p:cNvPicPr>
+            <a:picLocks noChangeAspect="1"/>
+          </p:cNvPicPr>
+          <p:nvPr/>
+        </p:nvPicPr>
+        <p:blipFill>
+          <a:blip r:embed="rId2"/>
+          <a:stretch>
+            <a:fillRect/>
+          </a:stretch>
+        </p:blipFill>
+        <p:spPr>
+          <a:xfrm>
+            <a:off x="680321" y="2653973"/>
+            <a:ext cx="6397016" cy="3555097"/>
+          </a:xfrm>
+          <a:prstGeom prst="rect">
+            <a:avLst/>
+          </a:prstGeom>
+        </p:spPr>
+      </p:pic>
+      <p:pic>
+        <p:nvPicPr>
+          <p:cNvPr id="3" name="Content Placeholder 15"/>
+          <p:cNvPicPr>
+            <a:picLocks noChangeAspect="1"/>
+          </p:cNvPicPr>
+          <p:nvPr/>
+        </p:nvPicPr>
+        <p:blipFill>
+          <a:blip r:embed="rId3"/>
+          <a:stretch>
+            <a:fillRect/>
+          </a:stretch>
+        </p:blipFill>
+        <p:spPr>
+          <a:xfrm>
+            <a:off x="5872929" y="504507"/>
+            <a:ext cx="5904996" cy="3344822"/>
+          </a:xfrm>
+          <a:prstGeom prst="rect">
+            <a:avLst/>
+          </a:prstGeom>
+        </p:spPr>
+      </p:pic>
     </p:spTree>
     <p:extLst>
       <p:ext uri="{BB962C8B-B14F-4D97-AF65-F5344CB8AC3E}">
-        <p14:creationId xmlns:p14="http://schemas.microsoft.com/office/powerpoint/2010/main" val="255266319"/>
+        <p14:creationId xmlns:p14="http://schemas.microsoft.com/office/powerpoint/2010/main" val="2585235678"/>
       </p:ext>
     </p:extLst>
   </p:cSld>
@@ -8112,6 +8136,527 @@
           <a:chExt cx="0" cy="0"/>
         </a:xfrm>
       </p:grpSpPr>
+      <p:pic>
+        <p:nvPicPr>
+          <p:cNvPr id="3" name="Picture 2"/>
+          <p:cNvPicPr>
+            <a:picLocks noChangeAspect="1"/>
+          </p:cNvPicPr>
+          <p:nvPr/>
+        </p:nvPicPr>
+        <p:blipFill>
+          <a:blip r:embed="rId2"/>
+          <a:stretch>
+            <a:fillRect/>
+          </a:stretch>
+        </p:blipFill>
+        <p:spPr>
+          <a:xfrm>
+            <a:off x="3223263" y="933983"/>
+            <a:ext cx="5379720" cy="1038490"/>
+          </a:xfrm>
+          <a:prstGeom prst="rect">
+            <a:avLst/>
+          </a:prstGeom>
+        </p:spPr>
+      </p:pic>
+      <p:pic>
+        <p:nvPicPr>
+          <p:cNvPr id="5" name="Picture 4"/>
+          <p:cNvPicPr>
+            <a:picLocks noChangeAspect="1"/>
+          </p:cNvPicPr>
+          <p:nvPr/>
+        </p:nvPicPr>
+        <p:blipFill>
+          <a:blip r:embed="rId3"/>
+          <a:stretch>
+            <a:fillRect/>
+          </a:stretch>
+        </p:blipFill>
+        <p:spPr>
+          <a:xfrm>
+            <a:off x="6125496" y="2432679"/>
+            <a:ext cx="5474970" cy="3440430"/>
+          </a:xfrm>
+          <a:prstGeom prst="rect">
+            <a:avLst/>
+          </a:prstGeom>
+        </p:spPr>
+      </p:pic>
+      <p:pic>
+        <p:nvPicPr>
+          <p:cNvPr id="7" name="Picture 6"/>
+          <p:cNvPicPr>
+            <a:picLocks noChangeAspect="1"/>
+          </p:cNvPicPr>
+          <p:nvPr/>
+        </p:nvPicPr>
+        <p:blipFill>
+          <a:blip r:embed="rId4"/>
+          <a:stretch>
+            <a:fillRect/>
+          </a:stretch>
+        </p:blipFill>
+        <p:spPr>
+          <a:xfrm>
+            <a:off x="533403" y="2432679"/>
+            <a:ext cx="5379720" cy="3448050"/>
+          </a:xfrm>
+          <a:prstGeom prst="rect">
+            <a:avLst/>
+          </a:prstGeom>
+        </p:spPr>
+      </p:pic>
+    </p:spTree>
+    <p:extLst>
+      <p:ext uri="{BB962C8B-B14F-4D97-AF65-F5344CB8AC3E}">
+        <p14:creationId xmlns:p14="http://schemas.microsoft.com/office/powerpoint/2010/main" val="4260902383"/>
+      </p:ext>
+    </p:extLst>
+  </p:cSld>
+  <p:clrMapOvr>
+    <a:masterClrMapping/>
+  </p:clrMapOvr>
+</p:sld>
+</file>
+
+<file path=ppt/slides/slide14.xml><?xml version="1.0" encoding="utf-8"?>
+<p:sld xmlns:a="http://schemas.openxmlformats.org/drawingml/2006/main" xmlns:r="http://schemas.openxmlformats.org/officeDocument/2006/relationships" xmlns:p="http://schemas.openxmlformats.org/presentationml/2006/main">
+  <p:cSld>
+    <p:spTree>
+      <p:nvGrpSpPr>
+        <p:cNvPr id="1" name=""/>
+        <p:cNvGrpSpPr/>
+        <p:nvPr/>
+      </p:nvGrpSpPr>
+      <p:grpSpPr>
+        <a:xfrm>
+          <a:off x="0" y="0"/>
+          <a:ext cx="0" cy="0"/>
+          <a:chOff x="0" y="0"/>
+          <a:chExt cx="0" cy="0"/>
+        </a:xfrm>
+      </p:grpSpPr>
+      <p:pic>
+        <p:nvPicPr>
+          <p:cNvPr id="3" name="Picture 2"/>
+          <p:cNvPicPr>
+            <a:picLocks noChangeAspect="1"/>
+          </p:cNvPicPr>
+          <p:nvPr/>
+        </p:nvPicPr>
+        <p:blipFill>
+          <a:blip r:embed="rId2"/>
+          <a:stretch>
+            <a:fillRect/>
+          </a:stretch>
+        </p:blipFill>
+        <p:spPr>
+          <a:xfrm>
+            <a:off x="6187318" y="2831567"/>
+            <a:ext cx="5539740" cy="3436620"/>
+          </a:xfrm>
+          <a:prstGeom prst="rect">
+            <a:avLst/>
+          </a:prstGeom>
+        </p:spPr>
+      </p:pic>
+      <p:pic>
+        <p:nvPicPr>
+          <p:cNvPr id="5" name="Picture 4"/>
+          <p:cNvPicPr>
+            <a:picLocks noChangeAspect="1"/>
+          </p:cNvPicPr>
+          <p:nvPr/>
+        </p:nvPicPr>
+        <p:blipFill>
+          <a:blip r:embed="rId3"/>
+          <a:stretch>
+            <a:fillRect/>
+          </a:stretch>
+        </p:blipFill>
+        <p:spPr>
+          <a:xfrm>
+            <a:off x="412095" y="448164"/>
+            <a:ext cx="5524500" cy="3459480"/>
+          </a:xfrm>
+          <a:prstGeom prst="rect">
+            <a:avLst/>
+          </a:prstGeom>
+        </p:spPr>
+      </p:pic>
+    </p:spTree>
+    <p:extLst>
+      <p:ext uri="{BB962C8B-B14F-4D97-AF65-F5344CB8AC3E}">
+        <p14:creationId xmlns:p14="http://schemas.microsoft.com/office/powerpoint/2010/main" val="3754812156"/>
+      </p:ext>
+    </p:extLst>
+  </p:cSld>
+  <p:clrMapOvr>
+    <a:masterClrMapping/>
+  </p:clrMapOvr>
+</p:sld>
+</file>
+
+<file path=ppt/slides/slide15.xml><?xml version="1.0" encoding="utf-8"?>
+<p:sld xmlns:a="http://schemas.openxmlformats.org/drawingml/2006/main" xmlns:r="http://schemas.openxmlformats.org/officeDocument/2006/relationships" xmlns:p="http://schemas.openxmlformats.org/presentationml/2006/main">
+  <p:cSld>
+    <p:spTree>
+      <p:nvGrpSpPr>
+        <p:cNvPr id="1" name=""/>
+        <p:cNvGrpSpPr/>
+        <p:nvPr/>
+      </p:nvGrpSpPr>
+      <p:grpSpPr>
+        <a:xfrm>
+          <a:off x="0" y="0"/>
+          <a:ext cx="0" cy="0"/>
+          <a:chOff x="0" y="0"/>
+          <a:chExt cx="0" cy="0"/>
+        </a:xfrm>
+      </p:grpSpPr>
+      <p:sp>
+        <p:nvSpPr>
+          <p:cNvPr id="2" name="Title 1"/>
+          <p:cNvSpPr>
+            <a:spLocks noGrp="1"/>
+          </p:cNvSpPr>
+          <p:nvPr>
+            <p:ph type="title"/>
+          </p:nvPr>
+        </p:nvSpPr>
+        <p:spPr/>
+        <p:txBody>
+          <a:bodyPr/>
+          <a:lstStyle/>
+          <a:p>
+            <a:r>
+              <a:rPr lang="en-US" dirty="0"/>
+              <a:t>Importance of Work</a:t>
+            </a:r>
+          </a:p>
+        </p:txBody>
+      </p:sp>
+      <p:sp>
+        <p:nvSpPr>
+          <p:cNvPr id="3" name="Content Placeholder 2"/>
+          <p:cNvSpPr>
+            <a:spLocks noGrp="1"/>
+          </p:cNvSpPr>
+          <p:nvPr>
+            <p:ph sz="half" idx="1"/>
+          </p:nvPr>
+        </p:nvSpPr>
+        <p:spPr/>
+        <p:txBody>
+          <a:bodyPr>
+            <a:normAutofit/>
+          </a:bodyPr>
+          <a:lstStyle/>
+          <a:p>
+            <a:r>
+              <a:rPr lang="en-US" dirty="0"/>
+              <a:t>0.2% of the population is estimated to be affected by this condition – about 500,000 people in the US alone</a:t>
+            </a:r>
+          </a:p>
+          <a:p>
+            <a:r>
+              <a:rPr lang="en-US" dirty="0"/>
+              <a:t>25% of patients are disabled to the point of being unable to work</a:t>
+            </a:r>
+          </a:p>
+        </p:txBody>
+      </p:sp>
+      <p:sp>
+        <p:nvSpPr>
+          <p:cNvPr id="4" name="Content Placeholder 3"/>
+          <p:cNvSpPr>
+            <a:spLocks noGrp="1"/>
+          </p:cNvSpPr>
+          <p:nvPr>
+            <p:ph sz="half" idx="2"/>
+          </p:nvPr>
+        </p:nvSpPr>
+        <p:spPr/>
+        <p:txBody>
+          <a:bodyPr>
+            <a:normAutofit/>
+          </a:bodyPr>
+          <a:lstStyle/>
+          <a:p>
+            <a:r>
+              <a:rPr lang="en-US" dirty="0"/>
+              <a:t>Current treatment is limited to trial and error, and is poorly quantified – feeling better or worse without hard measurements</a:t>
+            </a:r>
+          </a:p>
+          <a:p>
+            <a:r>
+              <a:rPr lang="en-US" dirty="0"/>
+              <a:t>Current treatment has no long term studies on viability or effects – no FDA approved medication for this syndrome</a:t>
+            </a:r>
+          </a:p>
+        </p:txBody>
+      </p:sp>
+    </p:spTree>
+    <p:extLst>
+      <p:ext uri="{BB962C8B-B14F-4D97-AF65-F5344CB8AC3E}">
+        <p14:creationId xmlns:p14="http://schemas.microsoft.com/office/powerpoint/2010/main" val="3013585068"/>
+      </p:ext>
+    </p:extLst>
+  </p:cSld>
+  <p:clrMapOvr>
+    <a:masterClrMapping/>
+  </p:clrMapOvr>
+</p:sld>
+</file>
+
+<file path=ppt/slides/slide16.xml><?xml version="1.0" encoding="utf-8"?>
+<p:sld xmlns:a="http://schemas.openxmlformats.org/drawingml/2006/main" xmlns:r="http://schemas.openxmlformats.org/officeDocument/2006/relationships" xmlns:p="http://schemas.openxmlformats.org/presentationml/2006/main">
+  <p:cSld>
+    <p:spTree>
+      <p:nvGrpSpPr>
+        <p:cNvPr id="1" name=""/>
+        <p:cNvGrpSpPr/>
+        <p:nvPr/>
+      </p:nvGrpSpPr>
+      <p:grpSpPr>
+        <a:xfrm>
+          <a:off x="0" y="0"/>
+          <a:ext cx="0" cy="0"/>
+          <a:chOff x="0" y="0"/>
+          <a:chExt cx="0" cy="0"/>
+        </a:xfrm>
+      </p:grpSpPr>
+      <p:sp>
+        <p:nvSpPr>
+          <p:cNvPr id="2" name="Title 1"/>
+          <p:cNvSpPr>
+            <a:spLocks noGrp="1"/>
+          </p:cNvSpPr>
+          <p:nvPr>
+            <p:ph type="title"/>
+          </p:nvPr>
+        </p:nvSpPr>
+        <p:spPr/>
+        <p:txBody>
+          <a:bodyPr/>
+          <a:lstStyle/>
+          <a:p>
+            <a:r>
+              <a:rPr lang="en-US" dirty="0"/>
+              <a:t>Importance of Work cont.</a:t>
+            </a:r>
+          </a:p>
+        </p:txBody>
+      </p:sp>
+      <p:sp>
+        <p:nvSpPr>
+          <p:cNvPr id="3" name="Content Placeholder 2"/>
+          <p:cNvSpPr>
+            <a:spLocks noGrp="1"/>
+          </p:cNvSpPr>
+          <p:nvPr>
+            <p:ph sz="half" idx="1"/>
+          </p:nvPr>
+        </p:nvSpPr>
+        <p:spPr/>
+        <p:txBody>
+          <a:bodyPr>
+            <a:normAutofit lnSpcReduction="10000"/>
+          </a:bodyPr>
+          <a:lstStyle/>
+          <a:p>
+            <a:r>
+              <a:rPr lang="en-US" dirty="0"/>
+              <a:t>Potential proof of concept</a:t>
+            </a:r>
+          </a:p>
+          <a:p>
+            <a:r>
+              <a:rPr lang="en-US" dirty="0"/>
+              <a:t>If observational and quantitative methods are proven viable using commercial wearable technology this technique could be expanded to medical experiments into medication</a:t>
+            </a:r>
+          </a:p>
+        </p:txBody>
+      </p:sp>
+      <p:sp>
+        <p:nvSpPr>
+          <p:cNvPr id="4" name="Content Placeholder 3"/>
+          <p:cNvSpPr>
+            <a:spLocks noGrp="1"/>
+          </p:cNvSpPr>
+          <p:nvPr>
+            <p:ph sz="half" idx="2"/>
+          </p:nvPr>
+        </p:nvSpPr>
+        <p:spPr/>
+        <p:txBody>
+          <a:bodyPr>
+            <a:normAutofit lnSpcReduction="10000"/>
+          </a:bodyPr>
+          <a:lstStyle/>
+          <a:p>
+            <a:r>
+              <a:rPr lang="en-US" dirty="0"/>
+              <a:t>If associations and patterns are identified and a model can be built to predict symptoms, these identified factors can be used to guide additional research into the underlying mechanisms</a:t>
+            </a:r>
+          </a:p>
+          <a:p>
+            <a:r>
+              <a:rPr lang="en-US" dirty="0"/>
+              <a:t>Potential cost saving method in conduction observational studies and research experiments</a:t>
+            </a:r>
+          </a:p>
+        </p:txBody>
+      </p:sp>
+    </p:spTree>
+    <p:extLst>
+      <p:ext uri="{BB962C8B-B14F-4D97-AF65-F5344CB8AC3E}">
+        <p14:creationId xmlns:p14="http://schemas.microsoft.com/office/powerpoint/2010/main" val="3325926129"/>
+      </p:ext>
+    </p:extLst>
+  </p:cSld>
+  <p:clrMapOvr>
+    <a:masterClrMapping/>
+  </p:clrMapOvr>
+</p:sld>
+</file>
+
+<file path=ppt/slides/slide17.xml><?xml version="1.0" encoding="utf-8"?>
+<p:sld xmlns:a="http://schemas.openxmlformats.org/drawingml/2006/main" xmlns:r="http://schemas.openxmlformats.org/officeDocument/2006/relationships" xmlns:p="http://schemas.openxmlformats.org/presentationml/2006/main">
+  <p:cSld>
+    <p:spTree>
+      <p:nvGrpSpPr>
+        <p:cNvPr id="1" name=""/>
+        <p:cNvGrpSpPr/>
+        <p:nvPr/>
+      </p:nvGrpSpPr>
+      <p:grpSpPr>
+        <a:xfrm>
+          <a:off x="0" y="0"/>
+          <a:ext cx="0" cy="0"/>
+          <a:chOff x="0" y="0"/>
+          <a:chExt cx="0" cy="0"/>
+        </a:xfrm>
+      </p:grpSpPr>
+      <p:sp>
+        <p:nvSpPr>
+          <p:cNvPr id="2" name="Title 1"/>
+          <p:cNvSpPr>
+            <a:spLocks noGrp="1"/>
+          </p:cNvSpPr>
+          <p:nvPr>
+            <p:ph type="title"/>
+          </p:nvPr>
+        </p:nvSpPr>
+        <p:spPr/>
+        <p:txBody>
+          <a:bodyPr/>
+          <a:lstStyle/>
+          <a:p>
+            <a:r>
+              <a:rPr lang="en-US" dirty="0"/>
+              <a:t>Potential Challenges</a:t>
+            </a:r>
+          </a:p>
+        </p:txBody>
+      </p:sp>
+      <p:sp>
+        <p:nvSpPr>
+          <p:cNvPr id="3" name="Content Placeholder 2"/>
+          <p:cNvSpPr>
+            <a:spLocks noGrp="1"/>
+          </p:cNvSpPr>
+          <p:nvPr>
+            <p:ph sz="half" idx="1"/>
+          </p:nvPr>
+        </p:nvSpPr>
+        <p:spPr/>
+        <p:txBody>
+          <a:bodyPr/>
+          <a:lstStyle/>
+          <a:p>
+            <a:r>
+              <a:rPr lang="en-US" dirty="0"/>
+              <a:t>Accuracy</a:t>
+            </a:r>
+          </a:p>
+          <a:p>
+            <a:r>
+              <a:rPr lang="en-US" dirty="0"/>
+              <a:t>Missing data</a:t>
+            </a:r>
+          </a:p>
+          <a:p>
+            <a:r>
+              <a:rPr lang="en-US" dirty="0"/>
+              <a:t>Acceptance of the medical community</a:t>
+            </a:r>
+          </a:p>
+          <a:p>
+            <a:r>
+              <a:rPr lang="en-US" dirty="0"/>
+              <a:t>Limited scope – single patient study</a:t>
+            </a:r>
+          </a:p>
+          <a:p>
+            <a:r>
+              <a:rPr lang="en-US" dirty="0"/>
+              <a:t>Limited medical knowledge of the involved researchers</a:t>
+            </a:r>
+          </a:p>
+        </p:txBody>
+      </p:sp>
+      <p:sp>
+        <p:nvSpPr>
+          <p:cNvPr id="4" name="Content Placeholder 3"/>
+          <p:cNvSpPr>
+            <a:spLocks noGrp="1"/>
+          </p:cNvSpPr>
+          <p:nvPr>
+            <p:ph sz="half" idx="2"/>
+          </p:nvPr>
+        </p:nvSpPr>
+        <p:spPr/>
+        <p:txBody>
+          <a:bodyPr/>
+          <a:lstStyle/>
+          <a:p>
+            <a:endParaRPr lang="en-US" dirty="0"/>
+          </a:p>
+        </p:txBody>
+      </p:sp>
+    </p:spTree>
+    <p:extLst>
+      <p:ext uri="{BB962C8B-B14F-4D97-AF65-F5344CB8AC3E}">
+        <p14:creationId xmlns:p14="http://schemas.microsoft.com/office/powerpoint/2010/main" val="255266319"/>
+      </p:ext>
+    </p:extLst>
+  </p:cSld>
+  <p:clrMapOvr>
+    <a:masterClrMapping/>
+  </p:clrMapOvr>
+</p:sld>
+</file>
+
+<file path=ppt/slides/slide18.xml><?xml version="1.0" encoding="utf-8"?>
+<p:sld xmlns:a="http://schemas.openxmlformats.org/drawingml/2006/main" xmlns:r="http://schemas.openxmlformats.org/officeDocument/2006/relationships" xmlns:p="http://schemas.openxmlformats.org/presentationml/2006/main">
+  <p:cSld>
+    <p:spTree>
+      <p:nvGrpSpPr>
+        <p:cNvPr id="1" name=""/>
+        <p:cNvGrpSpPr/>
+        <p:nvPr/>
+      </p:nvGrpSpPr>
+      <p:grpSpPr>
+        <a:xfrm>
+          <a:off x="0" y="0"/>
+          <a:ext cx="0" cy="0"/>
+          <a:chOff x="0" y="0"/>
+          <a:chExt cx="0" cy="0"/>
+        </a:xfrm>
+      </p:grpSpPr>
       <p:sp>
         <p:nvSpPr>
           <p:cNvPr id="2" name="Title 1"/>
@@ -8228,7 +8773,7 @@
 </p:sld>
 </file>
 
-<file path=ppt/slides/slide14.xml><?xml version="1.0" encoding="utf-8"?>
+<file path=ppt/slides/slide19.xml><?xml version="1.0" encoding="utf-8"?>
 <p:sld xmlns:a="http://schemas.openxmlformats.org/drawingml/2006/main" xmlns:r="http://schemas.openxmlformats.org/officeDocument/2006/relationships" xmlns:p="http://schemas.openxmlformats.org/presentationml/2006/main">
   <p:cSld>
     <p:spTree>
@@ -8367,31 +8912,20 @@
             <p:ph sz="half" idx="1"/>
           </p:nvPr>
         </p:nvSpPr>
-        <p:spPr/>
+        <p:spPr>
+          <a:xfrm>
+            <a:off x="680320" y="2336873"/>
+            <a:ext cx="9748470" cy="3599316"/>
+          </a:xfrm>
+        </p:spPr>
         <p:txBody>
           <a:bodyPr/>
           <a:lstStyle/>
           <a:p>
+            <a:pPr marL="0" indent="0">
+              <a:buNone/>
+            </a:pPr>
             <a:endParaRPr lang="en-US" dirty="0"/>
-          </a:p>
-        </p:txBody>
-      </p:sp>
-      <p:sp>
-        <p:nvSpPr>
-          <p:cNvPr id="4" name="Content Placeholder 3"/>
-          <p:cNvSpPr>
-            <a:spLocks noGrp="1"/>
-          </p:cNvSpPr>
-          <p:nvPr>
-            <p:ph sz="half" idx="2"/>
-          </p:nvPr>
-        </p:nvSpPr>
-        <p:spPr/>
-        <p:txBody>
-          <a:bodyPr/>
-          <a:lstStyle/>
-          <a:p>
-            <a:endParaRPr lang="en-US"/>
           </a:p>
         </p:txBody>
       </p:sp>
@@ -9541,44 +10075,53 @@
           </a:p>
         </p:txBody>
       </p:sp>
-      <p:sp>
-        <p:nvSpPr>
-          <p:cNvPr id="3" name="Content Placeholder 2"/>
-          <p:cNvSpPr>
-            <a:spLocks noGrp="1"/>
-          </p:cNvSpPr>
+      <p:pic>
+        <p:nvPicPr>
+          <p:cNvPr id="10" name="Picture 9"/>
+          <p:cNvPicPr>
+            <a:picLocks noChangeAspect="1"/>
+          </p:cNvPicPr>
+          <p:nvPr/>
+        </p:nvPicPr>
+        <p:blipFill>
+          <a:blip r:embed="rId2"/>
+          <a:stretch>
+            <a:fillRect/>
+          </a:stretch>
+        </p:blipFill>
+        <p:spPr>
+          <a:xfrm>
+            <a:off x="4605976" y="2385141"/>
+            <a:ext cx="6587004" cy="3731139"/>
+          </a:xfrm>
+          <a:prstGeom prst="rect">
+            <a:avLst/>
+          </a:prstGeom>
+        </p:spPr>
+      </p:pic>
+      <p:pic>
+        <p:nvPicPr>
+          <p:cNvPr id="17" name="Content Placeholder 16"/>
+          <p:cNvPicPr>
+            <a:picLocks noGrp="1" noChangeAspect="1"/>
+          </p:cNvPicPr>
           <p:nvPr>
             <p:ph sz="half" idx="1"/>
           </p:nvPr>
-        </p:nvSpPr>
-        <p:spPr/>
-        <p:txBody>
-          <a:bodyPr/>
-          <a:lstStyle/>
-          <a:p>
-            <a:endParaRPr lang="en-US"/>
-          </a:p>
-        </p:txBody>
-      </p:sp>
-      <p:sp>
-        <p:nvSpPr>
-          <p:cNvPr id="4" name="Content Placeholder 3"/>
-          <p:cNvSpPr>
-            <a:spLocks noGrp="1"/>
-          </p:cNvSpPr>
-          <p:nvPr>
-            <p:ph sz="half" idx="2"/>
-          </p:nvPr>
-        </p:nvSpPr>
-        <p:spPr/>
-        <p:txBody>
-          <a:bodyPr/>
-          <a:lstStyle/>
-          <a:p>
-            <a:endParaRPr lang="en-US"/>
-          </a:p>
-        </p:txBody>
-      </p:sp>
+        </p:nvPicPr>
+        <p:blipFill>
+          <a:blip r:embed="rId3"/>
+          <a:stretch>
+            <a:fillRect/>
+          </a:stretch>
+        </p:blipFill>
+        <p:spPr>
+          <a:xfrm>
+            <a:off x="1397786" y="2385140"/>
+            <a:ext cx="2655882" cy="3731139"/>
+          </a:xfrm>
+        </p:spPr>
+      </p:pic>
     </p:spTree>
     <p:extLst>
       <p:ext uri="{BB962C8B-B14F-4D97-AF65-F5344CB8AC3E}">

</xml_diff>